<commit_message>
last checks on docs and code
</commit_message>
<xml_diff>
--- a/template.pptx
+++ b/template.pptx
@@ -113,6 +113,11 @@
       </a:defRPr>
     </a:lvl9pPr>
   </p:defaultTextStyle>
+  <p:extLst>
+    <p:ext uri="{EFAFB233-063F-42B5-8137-9DF3F51BA10A}">
+      <p15:sldGuideLst xmlns:p15="http://schemas.microsoft.com/office/powerpoint/2012/main"/>
+    </p:ext>
+  </p:extLst>
 </p:presentation>
 </file>
 
@@ -158,10 +163,9 @@
           </a:lstStyle>
           <a:p>
             <a:r>
-              <a:rPr lang="tr-TR" smtClean="0"/>
+              <a:rPr lang="tr-TR"/>
               <a:t>Asıl başlık stili için tıklatın</a:t>
             </a:r>
-            <a:endParaRPr lang="tr-TR"/>
           </a:p>
         </p:txBody>
       </p:sp>
@@ -223,10 +227,9 @@
           </a:lstStyle>
           <a:p>
             <a:r>
-              <a:rPr lang="tr-TR" smtClean="0"/>
+              <a:rPr lang="tr-TR"/>
               <a:t>Asıl alt başlık stilini düzenlemek için tıklayın</a:t>
             </a:r>
-            <a:endParaRPr lang="tr-TR"/>
           </a:p>
         </p:txBody>
       </p:sp>
@@ -341,10 +344,9 @@
           <a:lstStyle/>
           <a:p>
             <a:r>
-              <a:rPr lang="tr-TR" smtClean="0"/>
+              <a:rPr lang="tr-TR"/>
               <a:t>Asıl başlık stili için tıklatın</a:t>
             </a:r>
-            <a:endParaRPr lang="tr-TR"/>
           </a:p>
         </p:txBody>
       </p:sp>
@@ -365,38 +367,37 @@
           <a:p>
             <a:pPr lvl="0"/>
             <a:r>
-              <a:rPr lang="tr-TR" smtClean="0"/>
+              <a:rPr lang="tr-TR"/>
               <a:t>Asıl metin stillerini düzenle</a:t>
             </a:r>
           </a:p>
           <a:p>
             <a:pPr lvl="1"/>
             <a:r>
-              <a:rPr lang="tr-TR" smtClean="0"/>
+              <a:rPr lang="tr-TR"/>
               <a:t>İkinci düzey</a:t>
             </a:r>
           </a:p>
           <a:p>
             <a:pPr lvl="2"/>
             <a:r>
-              <a:rPr lang="tr-TR" smtClean="0"/>
+              <a:rPr lang="tr-TR"/>
               <a:t>Üçüncü düzey</a:t>
             </a:r>
           </a:p>
           <a:p>
             <a:pPr lvl="3"/>
             <a:r>
-              <a:rPr lang="tr-TR" smtClean="0"/>
+              <a:rPr lang="tr-TR"/>
               <a:t>Dördüncü düzey</a:t>
             </a:r>
           </a:p>
           <a:p>
             <a:pPr lvl="4"/>
             <a:r>
-              <a:rPr lang="tr-TR" smtClean="0"/>
+              <a:rPr lang="tr-TR"/>
               <a:t>Beşinci düzey</a:t>
             </a:r>
-            <a:endParaRPr lang="tr-TR"/>
           </a:p>
         </p:txBody>
       </p:sp>
@@ -516,10 +517,9 @@
           <a:lstStyle/>
           <a:p>
             <a:r>
-              <a:rPr lang="tr-TR" smtClean="0"/>
+              <a:rPr lang="tr-TR"/>
               <a:t>Asıl başlık stili için tıklatın</a:t>
             </a:r>
-            <a:endParaRPr lang="tr-TR"/>
           </a:p>
         </p:txBody>
       </p:sp>
@@ -545,38 +545,37 @@
           <a:p>
             <a:pPr lvl="0"/>
             <a:r>
-              <a:rPr lang="tr-TR" smtClean="0"/>
+              <a:rPr lang="tr-TR"/>
               <a:t>Asıl metin stillerini düzenle</a:t>
             </a:r>
           </a:p>
           <a:p>
             <a:pPr lvl="1"/>
             <a:r>
-              <a:rPr lang="tr-TR" smtClean="0"/>
+              <a:rPr lang="tr-TR"/>
               <a:t>İkinci düzey</a:t>
             </a:r>
           </a:p>
           <a:p>
             <a:pPr lvl="2"/>
             <a:r>
-              <a:rPr lang="tr-TR" smtClean="0"/>
+              <a:rPr lang="tr-TR"/>
               <a:t>Üçüncü düzey</a:t>
             </a:r>
           </a:p>
           <a:p>
             <a:pPr lvl="3"/>
             <a:r>
-              <a:rPr lang="tr-TR" smtClean="0"/>
+              <a:rPr lang="tr-TR"/>
               <a:t>Dördüncü düzey</a:t>
             </a:r>
           </a:p>
           <a:p>
             <a:pPr lvl="4"/>
             <a:r>
-              <a:rPr lang="tr-TR" smtClean="0"/>
+              <a:rPr lang="tr-TR"/>
               <a:t>Beşinci düzey</a:t>
             </a:r>
-            <a:endParaRPr lang="tr-TR"/>
           </a:p>
         </p:txBody>
       </p:sp>
@@ -691,10 +690,9 @@
           <a:lstStyle/>
           <a:p>
             <a:r>
-              <a:rPr lang="tr-TR" smtClean="0"/>
+              <a:rPr lang="tr-TR"/>
               <a:t>Asıl başlık stili için tıklatın</a:t>
             </a:r>
-            <a:endParaRPr lang="tr-TR"/>
           </a:p>
         </p:txBody>
       </p:sp>
@@ -715,38 +713,37 @@
           <a:p>
             <a:pPr lvl="0"/>
             <a:r>
-              <a:rPr lang="tr-TR" smtClean="0"/>
+              <a:rPr lang="tr-TR"/>
               <a:t>Asıl metin stillerini düzenle</a:t>
             </a:r>
           </a:p>
           <a:p>
             <a:pPr lvl="1"/>
             <a:r>
-              <a:rPr lang="tr-TR" smtClean="0"/>
+              <a:rPr lang="tr-TR"/>
               <a:t>İkinci düzey</a:t>
             </a:r>
           </a:p>
           <a:p>
             <a:pPr lvl="2"/>
             <a:r>
-              <a:rPr lang="tr-TR" smtClean="0"/>
+              <a:rPr lang="tr-TR"/>
               <a:t>Üçüncü düzey</a:t>
             </a:r>
           </a:p>
           <a:p>
             <a:pPr lvl="3"/>
             <a:r>
-              <a:rPr lang="tr-TR" smtClean="0"/>
+              <a:rPr lang="tr-TR"/>
               <a:t>Dördüncü düzey</a:t>
             </a:r>
           </a:p>
           <a:p>
             <a:pPr lvl="4"/>
             <a:r>
-              <a:rPr lang="tr-TR" smtClean="0"/>
+              <a:rPr lang="tr-TR"/>
               <a:t>Beşinci düzey</a:t>
             </a:r>
-            <a:endParaRPr lang="tr-TR"/>
           </a:p>
         </p:txBody>
       </p:sp>
@@ -870,10 +867,9 @@
           </a:lstStyle>
           <a:p>
             <a:r>
-              <a:rPr lang="tr-TR" smtClean="0"/>
+              <a:rPr lang="tr-TR"/>
               <a:t>Asıl başlık stili için tıklatın</a:t>
             </a:r>
-            <a:endParaRPr lang="tr-TR"/>
           </a:p>
         </p:txBody>
       </p:sp>
@@ -990,7 +986,7 @@
           <a:p>
             <a:pPr lvl="0"/>
             <a:r>
-              <a:rPr lang="tr-TR" smtClean="0"/>
+              <a:rPr lang="tr-TR"/>
               <a:t>Asıl metin stillerini düzenle</a:t>
             </a:r>
           </a:p>
@@ -1107,10 +1103,9 @@
           <a:lstStyle/>
           <a:p>
             <a:r>
-              <a:rPr lang="tr-TR" smtClean="0"/>
+              <a:rPr lang="tr-TR"/>
               <a:t>Asıl başlık stili için tıklatın</a:t>
             </a:r>
-            <a:endParaRPr lang="tr-TR"/>
           </a:p>
         </p:txBody>
       </p:sp>
@@ -1136,38 +1131,37 @@
           <a:p>
             <a:pPr lvl="0"/>
             <a:r>
-              <a:rPr lang="tr-TR" smtClean="0"/>
+              <a:rPr lang="tr-TR"/>
               <a:t>Asıl metin stillerini düzenle</a:t>
             </a:r>
           </a:p>
           <a:p>
             <a:pPr lvl="1"/>
             <a:r>
-              <a:rPr lang="tr-TR" smtClean="0"/>
+              <a:rPr lang="tr-TR"/>
               <a:t>İkinci düzey</a:t>
             </a:r>
           </a:p>
           <a:p>
             <a:pPr lvl="2"/>
             <a:r>
-              <a:rPr lang="tr-TR" smtClean="0"/>
+              <a:rPr lang="tr-TR"/>
               <a:t>Üçüncü düzey</a:t>
             </a:r>
           </a:p>
           <a:p>
             <a:pPr lvl="3"/>
             <a:r>
-              <a:rPr lang="tr-TR" smtClean="0"/>
+              <a:rPr lang="tr-TR"/>
               <a:t>Dördüncü düzey</a:t>
             </a:r>
           </a:p>
           <a:p>
             <a:pPr lvl="4"/>
             <a:r>
-              <a:rPr lang="tr-TR" smtClean="0"/>
+              <a:rPr lang="tr-TR"/>
               <a:t>Beşinci düzey</a:t>
             </a:r>
-            <a:endParaRPr lang="tr-TR"/>
           </a:p>
         </p:txBody>
       </p:sp>
@@ -1193,38 +1187,37 @@
           <a:p>
             <a:pPr lvl="0"/>
             <a:r>
-              <a:rPr lang="tr-TR" smtClean="0"/>
+              <a:rPr lang="tr-TR"/>
               <a:t>Asıl metin stillerini düzenle</a:t>
             </a:r>
           </a:p>
           <a:p>
             <a:pPr lvl="1"/>
             <a:r>
-              <a:rPr lang="tr-TR" smtClean="0"/>
+              <a:rPr lang="tr-TR"/>
               <a:t>İkinci düzey</a:t>
             </a:r>
           </a:p>
           <a:p>
             <a:pPr lvl="2"/>
             <a:r>
-              <a:rPr lang="tr-TR" smtClean="0"/>
+              <a:rPr lang="tr-TR"/>
               <a:t>Üçüncü düzey</a:t>
             </a:r>
           </a:p>
           <a:p>
             <a:pPr lvl="3"/>
             <a:r>
-              <a:rPr lang="tr-TR" smtClean="0"/>
+              <a:rPr lang="tr-TR"/>
               <a:t>Dördüncü düzey</a:t>
             </a:r>
           </a:p>
           <a:p>
             <a:pPr lvl="4"/>
             <a:r>
-              <a:rPr lang="tr-TR" smtClean="0"/>
+              <a:rPr lang="tr-TR"/>
               <a:t>Beşinci düzey</a:t>
             </a:r>
-            <a:endParaRPr lang="tr-TR"/>
           </a:p>
         </p:txBody>
       </p:sp>
@@ -1344,10 +1337,9 @@
           <a:lstStyle/>
           <a:p>
             <a:r>
-              <a:rPr lang="tr-TR" smtClean="0"/>
+              <a:rPr lang="tr-TR"/>
               <a:t>Asıl başlık stili için tıklatın</a:t>
             </a:r>
-            <a:endParaRPr lang="tr-TR"/>
           </a:p>
         </p:txBody>
       </p:sp>
@@ -1410,7 +1402,7 @@
           <a:p>
             <a:pPr lvl="0"/>
             <a:r>
-              <a:rPr lang="tr-TR" smtClean="0"/>
+              <a:rPr lang="tr-TR"/>
               <a:t>Asıl metin stillerini düzenle</a:t>
             </a:r>
           </a:p>
@@ -1438,38 +1430,37 @@
           <a:p>
             <a:pPr lvl="0"/>
             <a:r>
-              <a:rPr lang="tr-TR" smtClean="0"/>
+              <a:rPr lang="tr-TR"/>
               <a:t>Asıl metin stillerini düzenle</a:t>
             </a:r>
           </a:p>
           <a:p>
             <a:pPr lvl="1"/>
             <a:r>
-              <a:rPr lang="tr-TR" smtClean="0"/>
+              <a:rPr lang="tr-TR"/>
               <a:t>İkinci düzey</a:t>
             </a:r>
           </a:p>
           <a:p>
             <a:pPr lvl="2"/>
             <a:r>
-              <a:rPr lang="tr-TR" smtClean="0"/>
+              <a:rPr lang="tr-TR"/>
               <a:t>Üçüncü düzey</a:t>
             </a:r>
           </a:p>
           <a:p>
             <a:pPr lvl="3"/>
             <a:r>
-              <a:rPr lang="tr-TR" smtClean="0"/>
+              <a:rPr lang="tr-TR"/>
               <a:t>Dördüncü düzey</a:t>
             </a:r>
           </a:p>
           <a:p>
             <a:pPr lvl="4"/>
             <a:r>
-              <a:rPr lang="tr-TR" smtClean="0"/>
+              <a:rPr lang="tr-TR"/>
               <a:t>Beşinci düzey</a:t>
             </a:r>
-            <a:endParaRPr lang="tr-TR"/>
           </a:p>
         </p:txBody>
       </p:sp>
@@ -1532,7 +1523,7 @@
           <a:p>
             <a:pPr lvl="0"/>
             <a:r>
-              <a:rPr lang="tr-TR" smtClean="0"/>
+              <a:rPr lang="tr-TR"/>
               <a:t>Asıl metin stillerini düzenle</a:t>
             </a:r>
           </a:p>
@@ -1560,38 +1551,37 @@
           <a:p>
             <a:pPr lvl="0"/>
             <a:r>
-              <a:rPr lang="tr-TR" smtClean="0"/>
+              <a:rPr lang="tr-TR"/>
               <a:t>Asıl metin stillerini düzenle</a:t>
             </a:r>
           </a:p>
           <a:p>
             <a:pPr lvl="1"/>
             <a:r>
-              <a:rPr lang="tr-TR" smtClean="0"/>
+              <a:rPr lang="tr-TR"/>
               <a:t>İkinci düzey</a:t>
             </a:r>
           </a:p>
           <a:p>
             <a:pPr lvl="2"/>
             <a:r>
-              <a:rPr lang="tr-TR" smtClean="0"/>
+              <a:rPr lang="tr-TR"/>
               <a:t>Üçüncü düzey</a:t>
             </a:r>
           </a:p>
           <a:p>
             <a:pPr lvl="3"/>
             <a:r>
-              <a:rPr lang="tr-TR" smtClean="0"/>
+              <a:rPr lang="tr-TR"/>
               <a:t>Dördüncü düzey</a:t>
             </a:r>
           </a:p>
           <a:p>
             <a:pPr lvl="4"/>
             <a:r>
-              <a:rPr lang="tr-TR" smtClean="0"/>
+              <a:rPr lang="tr-TR"/>
               <a:t>Beşinci düzey</a:t>
             </a:r>
-            <a:endParaRPr lang="tr-TR"/>
           </a:p>
         </p:txBody>
       </p:sp>
@@ -1706,10 +1696,9 @@
           <a:lstStyle/>
           <a:p>
             <a:r>
-              <a:rPr lang="tr-TR" smtClean="0"/>
+              <a:rPr lang="tr-TR"/>
               <a:t>Asıl başlık stili için tıklatın</a:t>
             </a:r>
-            <a:endParaRPr lang="tr-TR"/>
           </a:p>
         </p:txBody>
       </p:sp>
@@ -1928,10 +1917,9 @@
           </a:lstStyle>
           <a:p>
             <a:r>
-              <a:rPr lang="tr-TR" smtClean="0"/>
+              <a:rPr lang="tr-TR"/>
               <a:t>Asıl başlık stili için tıklatın</a:t>
             </a:r>
-            <a:endParaRPr lang="tr-TR"/>
           </a:p>
         </p:txBody>
       </p:sp>
@@ -1985,38 +1973,37 @@
           <a:p>
             <a:pPr lvl="0"/>
             <a:r>
-              <a:rPr lang="tr-TR" smtClean="0"/>
+              <a:rPr lang="tr-TR"/>
               <a:t>Asıl metin stillerini düzenle</a:t>
             </a:r>
           </a:p>
           <a:p>
             <a:pPr lvl="1"/>
             <a:r>
-              <a:rPr lang="tr-TR" smtClean="0"/>
+              <a:rPr lang="tr-TR"/>
               <a:t>İkinci düzey</a:t>
             </a:r>
           </a:p>
           <a:p>
             <a:pPr lvl="2"/>
             <a:r>
-              <a:rPr lang="tr-TR" smtClean="0"/>
+              <a:rPr lang="tr-TR"/>
               <a:t>Üçüncü düzey</a:t>
             </a:r>
           </a:p>
           <a:p>
             <a:pPr lvl="3"/>
             <a:r>
-              <a:rPr lang="tr-TR" smtClean="0"/>
+              <a:rPr lang="tr-TR"/>
               <a:t>Dördüncü düzey</a:t>
             </a:r>
           </a:p>
           <a:p>
             <a:pPr lvl="4"/>
             <a:r>
-              <a:rPr lang="tr-TR" smtClean="0"/>
+              <a:rPr lang="tr-TR"/>
               <a:t>Beşinci düzey</a:t>
             </a:r>
-            <a:endParaRPr lang="tr-TR"/>
           </a:p>
         </p:txBody>
       </p:sp>
@@ -2079,7 +2066,7 @@
           <a:p>
             <a:pPr lvl="0"/>
             <a:r>
-              <a:rPr lang="tr-TR" smtClean="0"/>
+              <a:rPr lang="tr-TR"/>
               <a:t>Asıl metin stillerini düzenle</a:t>
             </a:r>
           </a:p>
@@ -2205,10 +2192,9 @@
           </a:lstStyle>
           <a:p>
             <a:r>
-              <a:rPr lang="tr-TR" smtClean="0"/>
+              <a:rPr lang="tr-TR"/>
               <a:t>Asıl başlık stili için tıklatın</a:t>
             </a:r>
-            <a:endParaRPr lang="tr-TR"/>
           </a:p>
         </p:txBody>
       </p:sp>
@@ -2332,7 +2318,7 @@
           <a:p>
             <a:pPr lvl="0"/>
             <a:r>
-              <a:rPr lang="tr-TR" smtClean="0"/>
+              <a:rPr lang="tr-TR"/>
               <a:t>Asıl metin stillerini düzenle</a:t>
             </a:r>
           </a:p>
@@ -2464,10 +2450,9 @@
           <a:lstStyle/>
           <a:p>
             <a:r>
-              <a:rPr lang="tr-TR" smtClean="0"/>
+              <a:rPr lang="tr-TR"/>
               <a:t>Asıl başlık stili için tıklatın</a:t>
             </a:r>
-            <a:endParaRPr lang="tr-TR"/>
           </a:p>
         </p:txBody>
       </p:sp>
@@ -2498,38 +2483,37 @@
           <a:p>
             <a:pPr lvl="0"/>
             <a:r>
-              <a:rPr lang="tr-TR" smtClean="0"/>
+              <a:rPr lang="tr-TR"/>
               <a:t>Asıl metin stillerini düzenle</a:t>
             </a:r>
           </a:p>
           <a:p>
             <a:pPr lvl="1"/>
             <a:r>
-              <a:rPr lang="tr-TR" smtClean="0"/>
+              <a:rPr lang="tr-TR"/>
               <a:t>İkinci düzey</a:t>
             </a:r>
           </a:p>
           <a:p>
             <a:pPr lvl="2"/>
             <a:r>
-              <a:rPr lang="tr-TR" smtClean="0"/>
+              <a:rPr lang="tr-TR"/>
               <a:t>Üçüncü düzey</a:t>
             </a:r>
           </a:p>
           <a:p>
             <a:pPr lvl="3"/>
             <a:r>
-              <a:rPr lang="tr-TR" smtClean="0"/>
+              <a:rPr lang="tr-TR"/>
               <a:t>Dördüncü düzey</a:t>
             </a:r>
           </a:p>
           <a:p>
             <a:pPr lvl="4"/>
             <a:r>
-              <a:rPr lang="tr-TR" smtClean="0"/>
+              <a:rPr lang="tr-TR"/>
               <a:t>Beşinci düzey</a:t>
             </a:r>
-            <a:endParaRPr lang="tr-TR"/>
           </a:p>
         </p:txBody>
       </p:sp>
@@ -2990,11 +2974,7 @@
           <a:p>
             <a:r>
               <a:rPr lang="en-US" dirty="0"/>
-              <a:t>BIL401 – Big Data – Final </a:t>
-            </a:r>
-            <a:r>
-              <a:rPr lang="en-US" dirty="0" smtClean="0"/>
-              <a:t>Report</a:t>
+              <a:t>BIL401 – Big Data – Final Report</a:t>
             </a:r>
             <a:endParaRPr lang="tr-TR" dirty="0"/>
           </a:p>

</xml_diff>